<commit_message>
Working on image validation loop
</commit_message>
<xml_diff>
--- a/sample_ppt/math_simple.pptx
+++ b/sample_ppt/math_simple.pptx
@@ -206,7 +206,7 @@
           <a:p>
             <a:fld id="{6AF810A6-5DC3-41BA-B9AF-1AFC43B9B844}" type="datetimeFigureOut">
               <a:rPr lang="ko-KR" altLang="en-US" smtClean="0"/>
-              <a:t>2026-01-05</a:t>
+              <a:t>2026-01-12</a:t>
             </a:fld>
             <a:endParaRPr lang="ko-KR" altLang="en-US"/>
           </a:p>
@@ -952,7 +952,7 @@
           <a:p>
             <a:fld id="{5089586E-BD85-40F7-91D0-2D30F22E1420}" type="datetime1">
               <a:rPr lang="ko-KR" altLang="en-US" smtClean="0"/>
-              <a:t>2026-01-05</a:t>
+              <a:t>2026-01-12</a:t>
             </a:fld>
             <a:endParaRPr lang="ko-KR" altLang="en-US"/>
           </a:p>
@@ -1150,7 +1150,7 @@
           <a:p>
             <a:fld id="{227C3C5F-4006-4632-B3DE-1A450914749C}" type="datetime1">
               <a:rPr lang="ko-KR" altLang="en-US" smtClean="0"/>
-              <a:t>2026-01-05</a:t>
+              <a:t>2026-01-12</a:t>
             </a:fld>
             <a:endParaRPr lang="ko-KR" altLang="en-US"/>
           </a:p>
@@ -1358,7 +1358,7 @@
           <a:p>
             <a:fld id="{DC02F847-FBC0-40A1-9801-1A7F5DBD685C}" type="datetime1">
               <a:rPr lang="ko-KR" altLang="en-US" smtClean="0"/>
-              <a:t>2026-01-05</a:t>
+              <a:t>2026-01-12</a:t>
             </a:fld>
             <a:endParaRPr lang="ko-KR" altLang="en-US"/>
           </a:p>
@@ -1616,7 +1616,7 @@
           <a:p>
             <a:fld id="{7C69DA4C-6DB5-4971-83A0-D7A667832670}" type="datetime1">
               <a:rPr lang="ko-KR" altLang="en-US" smtClean="0"/>
-              <a:t>2026-01-05</a:t>
+              <a:t>2026-01-12</a:t>
             </a:fld>
             <a:endParaRPr lang="ko-KR" altLang="en-US" dirty="0"/>
           </a:p>
@@ -1901,7 +1901,7 @@
           <a:p>
             <a:fld id="{A445D7E9-20A9-49C9-9C3A-2ABAF3661646}" type="datetime1">
               <a:rPr lang="ko-KR" altLang="en-US" smtClean="0"/>
-              <a:t>2026-01-05</a:t>
+              <a:t>2026-01-12</a:t>
             </a:fld>
             <a:endParaRPr lang="ko-KR" altLang="en-US"/>
           </a:p>
@@ -2166,7 +2166,7 @@
           <a:p>
             <a:fld id="{624A77D6-389E-4385-B919-32520EBBB886}" type="datetime1">
               <a:rPr lang="ko-KR" altLang="en-US" smtClean="0"/>
-              <a:t>2026-01-05</a:t>
+              <a:t>2026-01-12</a:t>
             </a:fld>
             <a:endParaRPr lang="ko-KR" altLang="en-US"/>
           </a:p>
@@ -2578,7 +2578,7 @@
           <a:p>
             <a:fld id="{359C83EB-4379-4C4A-A729-83BED85011BC}" type="datetime1">
               <a:rPr lang="ko-KR" altLang="en-US" smtClean="0"/>
-              <a:t>2026-01-05</a:t>
+              <a:t>2026-01-12</a:t>
             </a:fld>
             <a:endParaRPr lang="ko-KR" altLang="en-US"/>
           </a:p>
@@ -2719,7 +2719,7 @@
           <a:p>
             <a:fld id="{5545A2FA-8E15-452C-BCBA-7138BF312C2F}" type="datetime1">
               <a:rPr lang="ko-KR" altLang="en-US" smtClean="0"/>
-              <a:t>2026-01-05</a:t>
+              <a:t>2026-01-12</a:t>
             </a:fld>
             <a:endParaRPr lang="ko-KR" altLang="en-US"/>
           </a:p>
@@ -2832,7 +2832,7 @@
           <a:p>
             <a:fld id="{DC176177-E219-4A9E-8B2B-5E34E3322412}" type="datetime1">
               <a:rPr lang="ko-KR" altLang="en-US" smtClean="0"/>
-              <a:t>2026-01-05</a:t>
+              <a:t>2026-01-12</a:t>
             </a:fld>
             <a:endParaRPr lang="ko-KR" altLang="en-US"/>
           </a:p>
@@ -3143,7 +3143,7 @@
           <a:p>
             <a:fld id="{05B36191-433A-4CBD-B79B-1FD571FC08F0}" type="datetime1">
               <a:rPr lang="ko-KR" altLang="en-US" smtClean="0"/>
-              <a:t>2026-01-05</a:t>
+              <a:t>2026-01-12</a:t>
             </a:fld>
             <a:endParaRPr lang="ko-KR" altLang="en-US"/>
           </a:p>
@@ -3431,7 +3431,7 @@
           <a:p>
             <a:fld id="{92B00B89-E558-46DB-9986-9528BDBC138C}" type="datetime1">
               <a:rPr lang="ko-KR" altLang="en-US" smtClean="0"/>
-              <a:t>2026-01-05</a:t>
+              <a:t>2026-01-12</a:t>
             </a:fld>
             <a:endParaRPr lang="ko-KR" altLang="en-US"/>
           </a:p>
@@ -3672,7 +3672,7 @@
           <a:p>
             <a:fld id="{3027570D-6A7A-4AF9-B8FF-A0876744ADD1}" type="datetime1">
               <a:rPr lang="ko-KR" altLang="en-US" smtClean="0"/>
-              <a:t>2026-01-05</a:t>
+              <a:t>2026-01-12</a:t>
             </a:fld>
             <a:endParaRPr lang="ko-KR" altLang="en-US"/>
           </a:p>

</xml_diff>

<commit_message>
Colligated Entire Loop. Working but weakly. Buggy validation.
</commit_message>
<xml_diff>
--- a/sample_ppt/math_simple.pptx
+++ b/sample_ppt/math_simple.pptx
@@ -14,8 +14,8 @@
     <p:sldId id="258" r:id="rId5"/>
     <p:sldId id="259" r:id="rId6"/>
     <p:sldId id="260" r:id="rId7"/>
-    <p:sldId id="262" r:id="rId8"/>
-    <p:sldId id="264" r:id="rId9"/>
+    <p:sldId id="264" r:id="rId8"/>
+    <p:sldId id="262" r:id="rId9"/>
     <p:sldId id="263" r:id="rId10"/>
     <p:sldId id="266" r:id="rId11"/>
   </p:sldIdLst>
@@ -206,7 +206,7 @@
           <a:p>
             <a:fld id="{6AF810A6-5DC3-41BA-B9AF-1AFC43B9B844}" type="datetimeFigureOut">
               <a:rPr lang="ko-KR" altLang="en-US" smtClean="0"/>
-              <a:t>2026-01-12</a:t>
+              <a:t>2026-01-16</a:t>
             </a:fld>
             <a:endParaRPr lang="ko-KR" altLang="en-US"/>
           </a:p>
@@ -562,7 +562,7 @@
           <a:p>
             <a:fld id="{93FC2483-6890-482E-AC53-D876A7EA6DC4}" type="slidenum">
               <a:rPr lang="ko-KR" altLang="en-US" smtClean="0"/>
-              <a:t>8</a:t>
+              <a:t>7</a:t>
             </a:fld>
             <a:endParaRPr lang="ko-KR" altLang="en-US"/>
           </a:p>
@@ -952,7 +952,7 @@
           <a:p>
             <a:fld id="{5089586E-BD85-40F7-91D0-2D30F22E1420}" type="datetime1">
               <a:rPr lang="ko-KR" altLang="en-US" smtClean="0"/>
-              <a:t>2026-01-12</a:t>
+              <a:t>2026-01-16</a:t>
             </a:fld>
             <a:endParaRPr lang="ko-KR" altLang="en-US"/>
           </a:p>
@@ -1150,7 +1150,7 @@
           <a:p>
             <a:fld id="{227C3C5F-4006-4632-B3DE-1A450914749C}" type="datetime1">
               <a:rPr lang="ko-KR" altLang="en-US" smtClean="0"/>
-              <a:t>2026-01-12</a:t>
+              <a:t>2026-01-16</a:t>
             </a:fld>
             <a:endParaRPr lang="ko-KR" altLang="en-US"/>
           </a:p>
@@ -1358,7 +1358,7 @@
           <a:p>
             <a:fld id="{DC02F847-FBC0-40A1-9801-1A7F5DBD685C}" type="datetime1">
               <a:rPr lang="ko-KR" altLang="en-US" smtClean="0"/>
-              <a:t>2026-01-12</a:t>
+              <a:t>2026-01-16</a:t>
             </a:fld>
             <a:endParaRPr lang="ko-KR" altLang="en-US"/>
           </a:p>
@@ -1616,7 +1616,7 @@
           <a:p>
             <a:fld id="{7C69DA4C-6DB5-4971-83A0-D7A667832670}" type="datetime1">
               <a:rPr lang="ko-KR" altLang="en-US" smtClean="0"/>
-              <a:t>2026-01-12</a:t>
+              <a:t>2026-01-16</a:t>
             </a:fld>
             <a:endParaRPr lang="ko-KR" altLang="en-US" dirty="0"/>
           </a:p>
@@ -1901,7 +1901,7 @@
           <a:p>
             <a:fld id="{A445D7E9-20A9-49C9-9C3A-2ABAF3661646}" type="datetime1">
               <a:rPr lang="ko-KR" altLang="en-US" smtClean="0"/>
-              <a:t>2026-01-12</a:t>
+              <a:t>2026-01-16</a:t>
             </a:fld>
             <a:endParaRPr lang="ko-KR" altLang="en-US"/>
           </a:p>
@@ -2166,7 +2166,7 @@
           <a:p>
             <a:fld id="{624A77D6-389E-4385-B919-32520EBBB886}" type="datetime1">
               <a:rPr lang="ko-KR" altLang="en-US" smtClean="0"/>
-              <a:t>2026-01-12</a:t>
+              <a:t>2026-01-16</a:t>
             </a:fld>
             <a:endParaRPr lang="ko-KR" altLang="en-US"/>
           </a:p>
@@ -2578,7 +2578,7 @@
           <a:p>
             <a:fld id="{359C83EB-4379-4C4A-A729-83BED85011BC}" type="datetime1">
               <a:rPr lang="ko-KR" altLang="en-US" smtClean="0"/>
-              <a:t>2026-01-12</a:t>
+              <a:t>2026-01-16</a:t>
             </a:fld>
             <a:endParaRPr lang="ko-KR" altLang="en-US"/>
           </a:p>
@@ -2719,7 +2719,7 @@
           <a:p>
             <a:fld id="{5545A2FA-8E15-452C-BCBA-7138BF312C2F}" type="datetime1">
               <a:rPr lang="ko-KR" altLang="en-US" smtClean="0"/>
-              <a:t>2026-01-12</a:t>
+              <a:t>2026-01-16</a:t>
             </a:fld>
             <a:endParaRPr lang="ko-KR" altLang="en-US"/>
           </a:p>
@@ -2832,7 +2832,7 @@
           <a:p>
             <a:fld id="{DC176177-E219-4A9E-8B2B-5E34E3322412}" type="datetime1">
               <a:rPr lang="ko-KR" altLang="en-US" smtClean="0"/>
-              <a:t>2026-01-12</a:t>
+              <a:t>2026-01-16</a:t>
             </a:fld>
             <a:endParaRPr lang="ko-KR" altLang="en-US"/>
           </a:p>
@@ -3143,7 +3143,7 @@
           <a:p>
             <a:fld id="{05B36191-433A-4CBD-B79B-1FD571FC08F0}" type="datetime1">
               <a:rPr lang="ko-KR" altLang="en-US" smtClean="0"/>
-              <a:t>2026-01-12</a:t>
+              <a:t>2026-01-16</a:t>
             </a:fld>
             <a:endParaRPr lang="ko-KR" altLang="en-US"/>
           </a:p>
@@ -3431,7 +3431,7 @@
           <a:p>
             <a:fld id="{92B00B89-E558-46DB-9986-9528BDBC138C}" type="datetime1">
               <a:rPr lang="ko-KR" altLang="en-US" smtClean="0"/>
-              <a:t>2026-01-12</a:t>
+              <a:t>2026-01-16</a:t>
             </a:fld>
             <a:endParaRPr lang="ko-KR" altLang="en-US"/>
           </a:p>
@@ -3672,7 +3672,7 @@
           <a:p>
             <a:fld id="{3027570D-6A7A-4AF9-B8FF-A0876744ADD1}" type="datetime1">
               <a:rPr lang="ko-KR" altLang="en-US" smtClean="0"/>
-              <a:t>2026-01-12</a:t>
+              <a:t>2026-01-16</a:t>
             </a:fld>
             <a:endParaRPr lang="ko-KR" altLang="en-US"/>
           </a:p>
@@ -4776,9 +4776,8 @@
           <a:bodyPr/>
           <a:lstStyle/>
           <a:p>
-            <a:pPr>
-              <a:buFontTx/>
-              <a:buChar char="-"/>
+            <a:pPr marL="0" indent="0">
+              <a:buNone/>
             </a:pPr>
             <a:r>
               <a:rPr lang="en-US" altLang="ko-KR" b="1" dirty="0"/>
@@ -4798,9 +4797,8 @@
             </a:r>
           </a:p>
           <a:p>
-            <a:pPr>
-              <a:buFontTx/>
-              <a:buChar char="-"/>
+            <a:pPr marL="0" indent="0">
+              <a:buNone/>
             </a:pPr>
             <a:r>
               <a:rPr lang="en-US" altLang="ko-KR" b="1" dirty="0"/>
@@ -4812,9 +4810,8 @@
             </a:r>
           </a:p>
           <a:p>
-            <a:pPr>
-              <a:buFontTx/>
-              <a:buChar char="-"/>
+            <a:pPr marL="0" indent="0">
+              <a:buNone/>
             </a:pPr>
             <a:r>
               <a:rPr lang="en-US" altLang="ko-KR" b="1" dirty="0"/>
@@ -4954,9 +4951,8 @@
           <a:bodyPr/>
           <a:lstStyle/>
           <a:p>
-            <a:pPr>
-              <a:buFontTx/>
-              <a:buChar char="-"/>
+            <a:pPr marL="0" indent="0">
+              <a:buNone/>
             </a:pPr>
             <a:r>
               <a:rPr lang="en-US" altLang="ko-KR" b="1" dirty="0"/>
@@ -4976,9 +4972,8 @@
             </a:r>
           </a:p>
           <a:p>
-            <a:pPr>
-              <a:buFontTx/>
-              <a:buChar char="-"/>
+            <a:pPr marL="0" indent="0">
+              <a:buNone/>
             </a:pPr>
             <a:r>
               <a:rPr lang="en-US" altLang="ko-KR" b="1" dirty="0"/>
@@ -4990,9 +4985,8 @@
             </a:r>
           </a:p>
           <a:p>
-            <a:pPr>
-              <a:buFontTx/>
-              <a:buChar char="-"/>
+            <a:pPr marL="0" indent="0">
+              <a:buNone/>
             </a:pPr>
             <a:r>
               <a:rPr lang="en-US" altLang="ko-KR" b="1" dirty="0"/>
@@ -6838,7 +6832,7 @@
         </p:nvSpPr>
         <p:spPr>
           <a:xfrm>
-            <a:off x="2724150" y="2766623"/>
+            <a:off x="2333625" y="2766623"/>
             <a:ext cx="8742484" cy="437440"/>
           </a:xfrm>
           <a:prstGeom prst="rect">
@@ -7209,6 +7203,440 @@
         <p:cNvPr id="1" name="">
           <a:extLst>
             <a:ext uri="{FF2B5EF4-FFF2-40B4-BE49-F238E27FC236}">
+              <a16:creationId xmlns:a16="http://schemas.microsoft.com/office/drawing/2014/main" id="{2A78F9E3-7C07-A00F-D36A-7A650F3E34F7}"/>
+            </a:ext>
+          </a:extLst>
+        </p:cNvPr>
+        <p:cNvGrpSpPr/>
+        <p:nvPr/>
+      </p:nvGrpSpPr>
+      <p:grpSpPr>
+        <a:xfrm>
+          <a:off x="0" y="0"/>
+          <a:ext cx="0" cy="0"/>
+          <a:chOff x="0" y="0"/>
+          <a:chExt cx="0" cy="0"/>
+        </a:xfrm>
+      </p:grpSpPr>
+      <p:sp>
+        <p:nvSpPr>
+          <p:cNvPr id="2" name="제목 1">
+            <a:extLst>
+              <a:ext uri="{FF2B5EF4-FFF2-40B4-BE49-F238E27FC236}">
+                <a16:creationId xmlns:a16="http://schemas.microsoft.com/office/drawing/2014/main" id="{98B53871-AF44-6F0E-7C84-093150146BDA}"/>
+              </a:ext>
+            </a:extLst>
+          </p:cNvPr>
+          <p:cNvSpPr>
+            <a:spLocks noGrp="1"/>
+          </p:cNvSpPr>
+          <p:nvPr>
+            <p:ph type="title"/>
+          </p:nvPr>
+        </p:nvSpPr>
+        <p:spPr/>
+        <p:txBody>
+          <a:bodyPr/>
+          <a:lstStyle/>
+          <a:p>
+            <a:r>
+              <a:rPr lang="en-US" altLang="ko-KR" dirty="0"/>
+              <a:t>Linear equation and system</a:t>
+            </a:r>
+            <a:endParaRPr lang="ko-KR" altLang="en-US" dirty="0"/>
+          </a:p>
+        </p:txBody>
+      </p:sp>
+      <p:sp>
+        <p:nvSpPr>
+          <p:cNvPr id="3" name="내용 개체 틀 2">
+            <a:extLst>
+              <a:ext uri="{FF2B5EF4-FFF2-40B4-BE49-F238E27FC236}">
+                <a16:creationId xmlns:a16="http://schemas.microsoft.com/office/drawing/2014/main" id="{215D95E7-6EAC-A61B-53F1-649B4B159290}"/>
+              </a:ext>
+            </a:extLst>
+          </p:cNvPr>
+          <p:cNvSpPr>
+            <a:spLocks noGrp="1"/>
+          </p:cNvSpPr>
+          <p:nvPr>
+            <p:ph idx="1"/>
+          </p:nvPr>
+        </p:nvSpPr>
+        <p:spPr>
+          <a:xfrm>
+            <a:off x="342899" y="967155"/>
+            <a:ext cx="11333285" cy="437440"/>
+          </a:xfrm>
+        </p:spPr>
+        <p:txBody>
+          <a:bodyPr>
+            <a:normAutofit/>
+          </a:bodyPr>
+          <a:lstStyle/>
+          <a:p>
+            <a:pPr marL="0" indent="0">
+              <a:buNone/>
+            </a:pPr>
+            <a:r>
+              <a:rPr lang="en-US" altLang="ko-KR" dirty="0"/>
+              <a:t>- </a:t>
+            </a:r>
+            <a:r>
+              <a:rPr lang="en-US" altLang="ko-KR" b="1" dirty="0"/>
+              <a:t>Linear system</a:t>
+            </a:r>
+            <a:r>
+              <a:rPr lang="en-US" altLang="ko-KR" dirty="0"/>
+              <a:t>: a set of linear equation involving the same variables</a:t>
+            </a:r>
+          </a:p>
+          <a:p>
+            <a:pPr marL="0" indent="0">
+              <a:buNone/>
+            </a:pPr>
+            <a:endParaRPr lang="ko-KR" altLang="en-US" dirty="0"/>
+          </a:p>
+        </p:txBody>
+      </p:sp>
+      <p:sp>
+        <p:nvSpPr>
+          <p:cNvPr id="4" name="슬라이드 번호 개체 틀 3">
+            <a:extLst>
+              <a:ext uri="{FF2B5EF4-FFF2-40B4-BE49-F238E27FC236}">
+                <a16:creationId xmlns:a16="http://schemas.microsoft.com/office/drawing/2014/main" id="{68C29211-0FD2-80BA-E404-A6FFA677D583}"/>
+              </a:ext>
+            </a:extLst>
+          </p:cNvPr>
+          <p:cNvSpPr>
+            <a:spLocks noGrp="1"/>
+          </p:cNvSpPr>
+          <p:nvPr>
+            <p:ph type="sldNum" sz="quarter" idx="12"/>
+          </p:nvPr>
+        </p:nvSpPr>
+        <p:spPr/>
+        <p:txBody>
+          <a:bodyPr/>
+          <a:lstStyle/>
+          <a:p>
+            <a:fld id="{9A9ABDE6-F26C-4589-9FF5-7FFDDB9572E4}" type="slidenum">
+              <a:rPr lang="ko-KR" altLang="en-US" smtClean="0"/>
+              <a:t>7</a:t>
+            </a:fld>
+            <a:endParaRPr lang="ko-KR" altLang="en-US"/>
+          </a:p>
+        </p:txBody>
+      </p:sp>
+      <p:pic>
+        <p:nvPicPr>
+          <p:cNvPr id="5124" name="Picture 4">
+            <a:extLst>
+              <a:ext uri="{FF2B5EF4-FFF2-40B4-BE49-F238E27FC236}">
+                <a16:creationId xmlns:a16="http://schemas.microsoft.com/office/drawing/2014/main" id="{9EEB4B36-8184-DEF8-B751-D09FB4DC5CE7}"/>
+              </a:ext>
+            </a:extLst>
+          </p:cNvPr>
+          <p:cNvPicPr>
+            <a:picLocks noChangeAspect="1" noChangeArrowheads="1"/>
+          </p:cNvPicPr>
+          <p:nvPr/>
+        </p:nvPicPr>
+        <p:blipFill>
+          <a:blip r:embed="rId3">
+            <a:extLst>
+              <a:ext uri="{28A0092B-C50C-407E-A947-70E740481C1C}">
+                <a14:useLocalDpi xmlns:a14="http://schemas.microsoft.com/office/drawing/2010/main" val="0"/>
+              </a:ext>
+            </a:extLst>
+          </a:blip>
+          <a:srcRect/>
+          <a:stretch>
+            <a:fillRect/>
+          </a:stretch>
+        </p:blipFill>
+        <p:spPr bwMode="auto">
+          <a:xfrm>
+            <a:off x="9018015" y="1081100"/>
+            <a:ext cx="1885950" cy="209550"/>
+          </a:xfrm>
+          <a:prstGeom prst="rect">
+            <a:avLst/>
+          </a:prstGeom>
+          <a:noFill/>
+          <a:extLst>
+            <a:ext uri="{909E8E84-426E-40DD-AFC4-6F175D3DCCD1}">
+              <a14:hiddenFill xmlns:a14="http://schemas.microsoft.com/office/drawing/2010/main">
+                <a:solidFill>
+                  <a:srgbClr val="FFFFFF"/>
+                </a:solidFill>
+              </a14:hiddenFill>
+            </a:ext>
+          </a:extLst>
+        </p:spPr>
+      </p:pic>
+      <p:grpSp>
+        <p:nvGrpSpPr>
+          <p:cNvPr id="5" name="그룹 4">
+            <a:extLst>
+              <a:ext uri="{FF2B5EF4-FFF2-40B4-BE49-F238E27FC236}">
+                <a16:creationId xmlns:a16="http://schemas.microsoft.com/office/drawing/2014/main" id="{469555EC-D5DC-9AB6-8FA8-1DC1CBD8701A}"/>
+              </a:ext>
+            </a:extLst>
+          </p:cNvPr>
+          <p:cNvGrpSpPr/>
+          <p:nvPr/>
+        </p:nvGrpSpPr>
+        <p:grpSpPr>
+          <a:xfrm>
+            <a:off x="1781019" y="2107505"/>
+            <a:ext cx="8523909" cy="1352550"/>
+            <a:chOff x="1438118" y="2012255"/>
+            <a:chExt cx="8523909" cy="1352550"/>
+          </a:xfrm>
+        </p:grpSpPr>
+        <p:pic>
+          <p:nvPicPr>
+            <p:cNvPr id="5128" name="Picture 8">
+              <a:extLst>
+                <a:ext uri="{FF2B5EF4-FFF2-40B4-BE49-F238E27FC236}">
+                  <a16:creationId xmlns:a16="http://schemas.microsoft.com/office/drawing/2014/main" id="{7EBF7802-76F1-59AC-5BBD-D783F748CC13}"/>
+                </a:ext>
+              </a:extLst>
+            </p:cNvPr>
+            <p:cNvPicPr>
+              <a:picLocks noChangeAspect="1" noChangeArrowheads="1"/>
+            </p:cNvPicPr>
+            <p:nvPr/>
+          </p:nvPicPr>
+          <p:blipFill>
+            <a:blip r:embed="rId4">
+              <a:extLst>
+                <a:ext uri="{28A0092B-C50C-407E-A947-70E740481C1C}">
+                  <a14:useLocalDpi xmlns:a14="http://schemas.microsoft.com/office/drawing/2010/main" val="0"/>
+                </a:ext>
+              </a:extLst>
+            </a:blip>
+            <a:srcRect/>
+            <a:stretch>
+              <a:fillRect/>
+            </a:stretch>
+          </p:blipFill>
+          <p:spPr bwMode="auto">
+            <a:xfrm>
+              <a:off x="1438118" y="2012255"/>
+              <a:ext cx="3629025" cy="1352550"/>
+            </a:xfrm>
+            <a:prstGeom prst="rect">
+              <a:avLst/>
+            </a:prstGeom>
+            <a:noFill/>
+            <a:extLst>
+              <a:ext uri="{909E8E84-426E-40DD-AFC4-6F175D3DCCD1}">
+                <a14:hiddenFill xmlns:a14="http://schemas.microsoft.com/office/drawing/2010/main">
+                  <a:solidFill>
+                    <a:srgbClr val="FFFFFF"/>
+                  </a:solidFill>
+                </a14:hiddenFill>
+              </a:ext>
+            </a:extLst>
+          </p:spPr>
+        </p:pic>
+        <p:pic>
+          <p:nvPicPr>
+            <p:cNvPr id="7172" name="Picture 4">
+              <a:extLst>
+                <a:ext uri="{FF2B5EF4-FFF2-40B4-BE49-F238E27FC236}">
+                  <a16:creationId xmlns:a16="http://schemas.microsoft.com/office/drawing/2014/main" id="{B58DB94D-5FC6-ECA0-8850-5979B0521F51}"/>
+                </a:ext>
+              </a:extLst>
+            </p:cNvPr>
+            <p:cNvPicPr>
+              <a:picLocks noChangeAspect="1" noChangeArrowheads="1"/>
+            </p:cNvPicPr>
+            <p:nvPr/>
+          </p:nvPicPr>
+          <p:blipFill>
+            <a:blip r:embed="rId5">
+              <a:extLst>
+                <a:ext uri="{28A0092B-C50C-407E-A947-70E740481C1C}">
+                  <a14:useLocalDpi xmlns:a14="http://schemas.microsoft.com/office/drawing/2010/main" val="0"/>
+                </a:ext>
+              </a:extLst>
+            </a:blip>
+            <a:srcRect/>
+            <a:stretch>
+              <a:fillRect/>
+            </a:stretch>
+          </p:blipFill>
+          <p:spPr bwMode="auto">
+            <a:xfrm>
+              <a:off x="6149025" y="2107505"/>
+              <a:ext cx="1343025" cy="1162050"/>
+            </a:xfrm>
+            <a:prstGeom prst="rect">
+              <a:avLst/>
+            </a:prstGeom>
+            <a:noFill/>
+            <a:extLst>
+              <a:ext uri="{909E8E84-426E-40DD-AFC4-6F175D3DCCD1}">
+                <a14:hiddenFill xmlns:a14="http://schemas.microsoft.com/office/drawing/2010/main">
+                  <a:solidFill>
+                    <a:srgbClr val="FFFFFF"/>
+                  </a:solidFill>
+                </a14:hiddenFill>
+              </a:ext>
+            </a:extLst>
+          </p:spPr>
+        </p:pic>
+        <p:pic>
+          <p:nvPicPr>
+            <p:cNvPr id="7174" name="Picture 6">
+              <a:extLst>
+                <a:ext uri="{FF2B5EF4-FFF2-40B4-BE49-F238E27FC236}">
+                  <a16:creationId xmlns:a16="http://schemas.microsoft.com/office/drawing/2014/main" id="{0AC58A0F-4FE6-0242-3BF1-9A2DB1BA2BEB}"/>
+                </a:ext>
+              </a:extLst>
+            </p:cNvPr>
+            <p:cNvPicPr>
+              <a:picLocks noChangeAspect="1" noChangeArrowheads="1"/>
+            </p:cNvPicPr>
+            <p:nvPr/>
+          </p:nvPicPr>
+          <p:blipFill>
+            <a:blip r:embed="rId6">
+              <a:extLst>
+                <a:ext uri="{28A0092B-C50C-407E-A947-70E740481C1C}">
+                  <a14:useLocalDpi xmlns:a14="http://schemas.microsoft.com/office/drawing/2010/main" val="0"/>
+                </a:ext>
+              </a:extLst>
+            </a:blip>
+            <a:srcRect/>
+            <a:stretch/>
+          </p:blipFill>
+          <p:spPr bwMode="auto">
+            <a:xfrm>
+              <a:off x="8573932" y="2088455"/>
+              <a:ext cx="1388095" cy="1181100"/>
+            </a:xfrm>
+            <a:prstGeom prst="rect">
+              <a:avLst/>
+            </a:prstGeom>
+            <a:noFill/>
+            <a:extLst>
+              <a:ext uri="{909E8E84-426E-40DD-AFC4-6F175D3DCCD1}">
+                <a14:hiddenFill xmlns:a14="http://schemas.microsoft.com/office/drawing/2010/main">
+                  <a:solidFill>
+                    <a:srgbClr val="FFFFFF"/>
+                  </a:solidFill>
+                </a14:hiddenFill>
+              </a:ext>
+            </a:extLst>
+          </p:spPr>
+        </p:pic>
+      </p:grpSp>
+      <p:sp>
+        <p:nvSpPr>
+          <p:cNvPr id="6" name="Rectangle 5">
+            <a:extLst>
+              <a:ext uri="{FF2B5EF4-FFF2-40B4-BE49-F238E27FC236}">
+                <a16:creationId xmlns:a16="http://schemas.microsoft.com/office/drawing/2014/main" id="{28061F10-38F5-9C05-7E3A-404A5AD1AF61}"/>
+              </a:ext>
+            </a:extLst>
+          </p:cNvPr>
+          <p:cNvSpPr/>
+          <p:nvPr/>
+        </p:nvSpPr>
+        <p:spPr>
+          <a:xfrm>
+            <a:off x="3432919" y="4535424"/>
+            <a:ext cx="4300292" cy="1128631"/>
+          </a:xfrm>
+          <a:prstGeom prst="rect">
+            <a:avLst/>
+          </a:prstGeom>
+        </p:spPr>
+        <p:style>
+          <a:lnRef idx="2">
+            <a:schemeClr val="accent1">
+              <a:shade val="15000"/>
+            </a:schemeClr>
+          </a:lnRef>
+          <a:fillRef idx="1">
+            <a:schemeClr val="accent1"/>
+          </a:fillRef>
+          <a:effectRef idx="0">
+            <a:schemeClr val="accent1"/>
+          </a:effectRef>
+          <a:fontRef idx="minor">
+            <a:schemeClr val="lt1"/>
+          </a:fontRef>
+        </p:style>
+        <p:txBody>
+          <a:bodyPr rtlCol="0" anchor="ctr"/>
+          <a:lstStyle/>
+          <a:p>
+            <a:pPr algn="ctr"/>
+            <a:endParaRPr lang="en-US" dirty="0"/>
+          </a:p>
+        </p:txBody>
+      </p:sp>
+      <p:sp>
+        <p:nvSpPr>
+          <p:cNvPr id="7" name="TextBox 6">
+            <a:extLst>
+              <a:ext uri="{FF2B5EF4-FFF2-40B4-BE49-F238E27FC236}">
+                <a16:creationId xmlns:a16="http://schemas.microsoft.com/office/drawing/2014/main" id="{873D8D93-4C9D-0145-BF98-2B199ABA23D5}"/>
+              </a:ext>
+            </a:extLst>
+          </p:cNvPr>
+          <p:cNvSpPr txBox="1"/>
+          <p:nvPr/>
+        </p:nvSpPr>
+        <p:spPr>
+          <a:xfrm>
+            <a:off x="2131858" y="4591907"/>
+            <a:ext cx="7153221" cy="1015663"/>
+          </a:xfrm>
+          <a:prstGeom prst="rect">
+            <a:avLst/>
+          </a:prstGeom>
+          <a:noFill/>
+        </p:spPr>
+        <p:txBody>
+          <a:bodyPr wrap="square" rtlCol="0">
+            <a:spAutoFit/>
+          </a:bodyPr>
+          <a:lstStyle/>
+          <a:p>
+            <a:r>
+              <a:rPr lang="en-US" sz="1200" dirty="0"/>
+              <a:t>TESTING TEXT OVERFLOW TESTING TEXT OVERFLOW TESTING TEXT OVERFLOWTESTING TEXT OVERFLOW TESTING TEXT OVERFLOW TESTING TEXT OVERFLOWTESTING TEXT OVERFLOW TESTING TEXT OVERFLOW TESTING TEXT OVERFLOWTESTING TEXT OVERFLOW TESTING TEXT OVERFLOW TESTING TEXT OVERFLOWTESTING TEXT OVERFLOW TESTING TEXT OVERFLOW TESTING TEXT OVERFLOWTESTING TEXT OVERFLOW TESTING TEXT OVERFLOW TESTING TEXT OVERFLOW</a:t>
+            </a:r>
+          </a:p>
+        </p:txBody>
+      </p:sp>
+    </p:spTree>
+    <p:extLst>
+      <p:ext uri="{BB962C8B-B14F-4D97-AF65-F5344CB8AC3E}">
+        <p14:creationId xmlns:p14="http://schemas.microsoft.com/office/powerpoint/2010/main" val="4072107092"/>
+      </p:ext>
+    </p:extLst>
+  </p:cSld>
+  <p:clrMapOvr>
+    <a:masterClrMapping/>
+  </p:clrMapOvr>
+</p:sld>
+</file>
+
+<file path=ppt/slides/slide8.xml><?xml version="1.0" encoding="utf-8"?>
+<p:sld xmlns:a="http://schemas.openxmlformats.org/drawingml/2006/main" xmlns:r="http://schemas.openxmlformats.org/officeDocument/2006/relationships" xmlns:p="http://schemas.openxmlformats.org/presentationml/2006/main">
+  <p:cSld>
+    <p:spTree>
+      <p:nvGrpSpPr>
+        <p:cNvPr id="1" name="">
+          <a:extLst>
+            <a:ext uri="{FF2B5EF4-FFF2-40B4-BE49-F238E27FC236}">
               <a16:creationId xmlns:a16="http://schemas.microsoft.com/office/drawing/2014/main" id="{170761A1-F1D9-F619-F0A4-71618B2A316C}"/>
             </a:ext>
           </a:extLst>
@@ -7271,8 +7699,8 @@
         </p:nvSpPr>
         <p:spPr>
           <a:xfrm>
-            <a:off x="342899" y="967155"/>
-            <a:ext cx="11333285" cy="437440"/>
+            <a:off x="1513996" y="967155"/>
+            <a:ext cx="8646377" cy="437440"/>
           </a:xfrm>
         </p:spPr>
         <p:txBody>
@@ -7281,7 +7709,7 @@
           </a:bodyPr>
           <a:lstStyle/>
           <a:p>
-            <a:pPr marL="0" indent="0">
+            <a:pPr marL="0" indent="0" algn="ctr">
               <a:buNone/>
             </a:pPr>
             <a:r>
@@ -7298,7 +7726,7 @@
             </a:r>
           </a:p>
           <a:p>
-            <a:pPr marL="0" indent="0">
+            <a:pPr marL="0" indent="0" algn="ctr">
               <a:buNone/>
             </a:pPr>
             <a:endParaRPr lang="ko-KR" altLang="en-US" dirty="0"/>
@@ -7328,7 +7756,7 @@
           <a:p>
             <a:fld id="{9A9ABDE6-F26C-4589-9FF5-7FFDDB9572E4}" type="slidenum">
               <a:rPr lang="ko-KR" altLang="en-US" smtClean="0"/>
-              <a:t>7</a:t>
+              <a:t>8</a:t>
             </a:fld>
             <a:endParaRPr lang="ko-KR" altLang="en-US"/>
           </a:p>
@@ -8145,359 +8573,6 @@
     <p:extLst>
       <p:ext uri="{BB962C8B-B14F-4D97-AF65-F5344CB8AC3E}">
         <p14:creationId xmlns:p14="http://schemas.microsoft.com/office/powerpoint/2010/main" val="1167953708"/>
-      </p:ext>
-    </p:extLst>
-  </p:cSld>
-  <p:clrMapOvr>
-    <a:masterClrMapping/>
-  </p:clrMapOvr>
-</p:sld>
-</file>
-
-<file path=ppt/slides/slide8.xml><?xml version="1.0" encoding="utf-8"?>
-<p:sld xmlns:a="http://schemas.openxmlformats.org/drawingml/2006/main" xmlns:r="http://schemas.openxmlformats.org/officeDocument/2006/relationships" xmlns:p="http://schemas.openxmlformats.org/presentationml/2006/main">
-  <p:cSld>
-    <p:spTree>
-      <p:nvGrpSpPr>
-        <p:cNvPr id="1" name="">
-          <a:extLst>
-            <a:ext uri="{FF2B5EF4-FFF2-40B4-BE49-F238E27FC236}">
-              <a16:creationId xmlns:a16="http://schemas.microsoft.com/office/drawing/2014/main" id="{2A78F9E3-7C07-A00F-D36A-7A650F3E34F7}"/>
-            </a:ext>
-          </a:extLst>
-        </p:cNvPr>
-        <p:cNvGrpSpPr/>
-        <p:nvPr/>
-      </p:nvGrpSpPr>
-      <p:grpSpPr>
-        <a:xfrm>
-          <a:off x="0" y="0"/>
-          <a:ext cx="0" cy="0"/>
-          <a:chOff x="0" y="0"/>
-          <a:chExt cx="0" cy="0"/>
-        </a:xfrm>
-      </p:grpSpPr>
-      <p:sp>
-        <p:nvSpPr>
-          <p:cNvPr id="2" name="제목 1">
-            <a:extLst>
-              <a:ext uri="{FF2B5EF4-FFF2-40B4-BE49-F238E27FC236}">
-                <a16:creationId xmlns:a16="http://schemas.microsoft.com/office/drawing/2014/main" id="{98B53871-AF44-6F0E-7C84-093150146BDA}"/>
-              </a:ext>
-            </a:extLst>
-          </p:cNvPr>
-          <p:cNvSpPr>
-            <a:spLocks noGrp="1"/>
-          </p:cNvSpPr>
-          <p:nvPr>
-            <p:ph type="title"/>
-          </p:nvPr>
-        </p:nvSpPr>
-        <p:spPr/>
-        <p:txBody>
-          <a:bodyPr/>
-          <a:lstStyle/>
-          <a:p>
-            <a:r>
-              <a:rPr lang="en-US" altLang="ko-KR" dirty="0"/>
-              <a:t>Linear equation and system</a:t>
-            </a:r>
-            <a:endParaRPr lang="ko-KR" altLang="en-US" dirty="0"/>
-          </a:p>
-        </p:txBody>
-      </p:sp>
-      <p:sp>
-        <p:nvSpPr>
-          <p:cNvPr id="3" name="내용 개체 틀 2">
-            <a:extLst>
-              <a:ext uri="{FF2B5EF4-FFF2-40B4-BE49-F238E27FC236}">
-                <a16:creationId xmlns:a16="http://schemas.microsoft.com/office/drawing/2014/main" id="{215D95E7-6EAC-A61B-53F1-649B4B159290}"/>
-              </a:ext>
-            </a:extLst>
-          </p:cNvPr>
-          <p:cNvSpPr>
-            <a:spLocks noGrp="1"/>
-          </p:cNvSpPr>
-          <p:nvPr>
-            <p:ph idx="1"/>
-          </p:nvPr>
-        </p:nvSpPr>
-        <p:spPr>
-          <a:xfrm>
-            <a:off x="342899" y="967155"/>
-            <a:ext cx="11333285" cy="437440"/>
-          </a:xfrm>
-        </p:spPr>
-        <p:txBody>
-          <a:bodyPr>
-            <a:normAutofit/>
-          </a:bodyPr>
-          <a:lstStyle/>
-          <a:p>
-            <a:pPr marL="0" indent="0">
-              <a:buNone/>
-            </a:pPr>
-            <a:r>
-              <a:rPr lang="en-US" altLang="ko-KR" dirty="0"/>
-              <a:t>- </a:t>
-            </a:r>
-            <a:r>
-              <a:rPr lang="en-US" altLang="ko-KR" b="1" dirty="0"/>
-              <a:t>Linear system</a:t>
-            </a:r>
-            <a:r>
-              <a:rPr lang="en-US" altLang="ko-KR" dirty="0"/>
-              <a:t>: a set of linear equation involving the same variables</a:t>
-            </a:r>
-          </a:p>
-          <a:p>
-            <a:pPr marL="0" indent="0">
-              <a:buNone/>
-            </a:pPr>
-            <a:endParaRPr lang="ko-KR" altLang="en-US" dirty="0"/>
-          </a:p>
-        </p:txBody>
-      </p:sp>
-      <p:sp>
-        <p:nvSpPr>
-          <p:cNvPr id="4" name="슬라이드 번호 개체 틀 3">
-            <a:extLst>
-              <a:ext uri="{FF2B5EF4-FFF2-40B4-BE49-F238E27FC236}">
-                <a16:creationId xmlns:a16="http://schemas.microsoft.com/office/drawing/2014/main" id="{68C29211-0FD2-80BA-E404-A6FFA677D583}"/>
-              </a:ext>
-            </a:extLst>
-          </p:cNvPr>
-          <p:cNvSpPr>
-            <a:spLocks noGrp="1"/>
-          </p:cNvSpPr>
-          <p:nvPr>
-            <p:ph type="sldNum" sz="quarter" idx="12"/>
-          </p:nvPr>
-        </p:nvSpPr>
-        <p:spPr/>
-        <p:txBody>
-          <a:bodyPr/>
-          <a:lstStyle/>
-          <a:p>
-            <a:fld id="{9A9ABDE6-F26C-4589-9FF5-7FFDDB9572E4}" type="slidenum">
-              <a:rPr lang="ko-KR" altLang="en-US" smtClean="0"/>
-              <a:t>8</a:t>
-            </a:fld>
-            <a:endParaRPr lang="ko-KR" altLang="en-US"/>
-          </a:p>
-        </p:txBody>
-      </p:sp>
-      <p:pic>
-        <p:nvPicPr>
-          <p:cNvPr id="5124" name="Picture 4">
-            <a:extLst>
-              <a:ext uri="{FF2B5EF4-FFF2-40B4-BE49-F238E27FC236}">
-                <a16:creationId xmlns:a16="http://schemas.microsoft.com/office/drawing/2014/main" id="{9EEB4B36-8184-DEF8-B751-D09FB4DC5CE7}"/>
-              </a:ext>
-            </a:extLst>
-          </p:cNvPr>
-          <p:cNvPicPr>
-            <a:picLocks noChangeAspect="1" noChangeArrowheads="1"/>
-          </p:cNvPicPr>
-          <p:nvPr/>
-        </p:nvPicPr>
-        <p:blipFill>
-          <a:blip r:embed="rId3">
-            <a:extLst>
-              <a:ext uri="{28A0092B-C50C-407E-A947-70E740481C1C}">
-                <a14:useLocalDpi xmlns:a14="http://schemas.microsoft.com/office/drawing/2010/main" val="0"/>
-              </a:ext>
-            </a:extLst>
-          </a:blip>
-          <a:srcRect/>
-          <a:stretch>
-            <a:fillRect/>
-          </a:stretch>
-        </p:blipFill>
-        <p:spPr bwMode="auto">
-          <a:xfrm>
-            <a:off x="9018015" y="1081100"/>
-            <a:ext cx="1885950" cy="209550"/>
-          </a:xfrm>
-          <a:prstGeom prst="rect">
-            <a:avLst/>
-          </a:prstGeom>
-          <a:noFill/>
-          <a:extLst>
-            <a:ext uri="{909E8E84-426E-40DD-AFC4-6F175D3DCCD1}">
-              <a14:hiddenFill xmlns:a14="http://schemas.microsoft.com/office/drawing/2010/main">
-                <a:solidFill>
-                  <a:srgbClr val="FFFFFF"/>
-                </a:solidFill>
-              </a14:hiddenFill>
-            </a:ext>
-          </a:extLst>
-        </p:spPr>
-      </p:pic>
-      <p:grpSp>
-        <p:nvGrpSpPr>
-          <p:cNvPr id="5" name="그룹 4">
-            <a:extLst>
-              <a:ext uri="{FF2B5EF4-FFF2-40B4-BE49-F238E27FC236}">
-                <a16:creationId xmlns:a16="http://schemas.microsoft.com/office/drawing/2014/main" id="{469555EC-D5DC-9AB6-8FA8-1DC1CBD8701A}"/>
-              </a:ext>
-            </a:extLst>
-          </p:cNvPr>
-          <p:cNvGrpSpPr/>
-          <p:nvPr/>
-        </p:nvGrpSpPr>
-        <p:grpSpPr>
-          <a:xfrm>
-            <a:off x="1781019" y="2107505"/>
-            <a:ext cx="8523909" cy="1352550"/>
-            <a:chOff x="1438118" y="2012255"/>
-            <a:chExt cx="8523909" cy="1352550"/>
-          </a:xfrm>
-        </p:grpSpPr>
-        <p:pic>
-          <p:nvPicPr>
-            <p:cNvPr id="5128" name="Picture 8">
-              <a:extLst>
-                <a:ext uri="{FF2B5EF4-FFF2-40B4-BE49-F238E27FC236}">
-                  <a16:creationId xmlns:a16="http://schemas.microsoft.com/office/drawing/2014/main" id="{7EBF7802-76F1-59AC-5BBD-D783F748CC13}"/>
-                </a:ext>
-              </a:extLst>
-            </p:cNvPr>
-            <p:cNvPicPr>
-              <a:picLocks noChangeAspect="1" noChangeArrowheads="1"/>
-            </p:cNvPicPr>
-            <p:nvPr/>
-          </p:nvPicPr>
-          <p:blipFill>
-            <a:blip r:embed="rId4">
-              <a:extLst>
-                <a:ext uri="{28A0092B-C50C-407E-A947-70E740481C1C}">
-                  <a14:useLocalDpi xmlns:a14="http://schemas.microsoft.com/office/drawing/2010/main" val="0"/>
-                </a:ext>
-              </a:extLst>
-            </a:blip>
-            <a:srcRect/>
-            <a:stretch>
-              <a:fillRect/>
-            </a:stretch>
-          </p:blipFill>
-          <p:spPr bwMode="auto">
-            <a:xfrm>
-              <a:off x="1438118" y="2012255"/>
-              <a:ext cx="3629025" cy="1352550"/>
-            </a:xfrm>
-            <a:prstGeom prst="rect">
-              <a:avLst/>
-            </a:prstGeom>
-            <a:noFill/>
-            <a:extLst>
-              <a:ext uri="{909E8E84-426E-40DD-AFC4-6F175D3DCCD1}">
-                <a14:hiddenFill xmlns:a14="http://schemas.microsoft.com/office/drawing/2010/main">
-                  <a:solidFill>
-                    <a:srgbClr val="FFFFFF"/>
-                  </a:solidFill>
-                </a14:hiddenFill>
-              </a:ext>
-            </a:extLst>
-          </p:spPr>
-        </p:pic>
-        <p:pic>
-          <p:nvPicPr>
-            <p:cNvPr id="7172" name="Picture 4">
-              <a:extLst>
-                <a:ext uri="{FF2B5EF4-FFF2-40B4-BE49-F238E27FC236}">
-                  <a16:creationId xmlns:a16="http://schemas.microsoft.com/office/drawing/2014/main" id="{B58DB94D-5FC6-ECA0-8850-5979B0521F51}"/>
-                </a:ext>
-              </a:extLst>
-            </p:cNvPr>
-            <p:cNvPicPr>
-              <a:picLocks noChangeAspect="1" noChangeArrowheads="1"/>
-            </p:cNvPicPr>
-            <p:nvPr/>
-          </p:nvPicPr>
-          <p:blipFill>
-            <a:blip r:embed="rId5">
-              <a:extLst>
-                <a:ext uri="{28A0092B-C50C-407E-A947-70E740481C1C}">
-                  <a14:useLocalDpi xmlns:a14="http://schemas.microsoft.com/office/drawing/2010/main" val="0"/>
-                </a:ext>
-              </a:extLst>
-            </a:blip>
-            <a:srcRect/>
-            <a:stretch>
-              <a:fillRect/>
-            </a:stretch>
-          </p:blipFill>
-          <p:spPr bwMode="auto">
-            <a:xfrm>
-              <a:off x="6149025" y="2107505"/>
-              <a:ext cx="1343025" cy="1162050"/>
-            </a:xfrm>
-            <a:prstGeom prst="rect">
-              <a:avLst/>
-            </a:prstGeom>
-            <a:noFill/>
-            <a:extLst>
-              <a:ext uri="{909E8E84-426E-40DD-AFC4-6F175D3DCCD1}">
-                <a14:hiddenFill xmlns:a14="http://schemas.microsoft.com/office/drawing/2010/main">
-                  <a:solidFill>
-                    <a:srgbClr val="FFFFFF"/>
-                  </a:solidFill>
-                </a14:hiddenFill>
-              </a:ext>
-            </a:extLst>
-          </p:spPr>
-        </p:pic>
-        <p:pic>
-          <p:nvPicPr>
-            <p:cNvPr id="7174" name="Picture 6">
-              <a:extLst>
-                <a:ext uri="{FF2B5EF4-FFF2-40B4-BE49-F238E27FC236}">
-                  <a16:creationId xmlns:a16="http://schemas.microsoft.com/office/drawing/2014/main" id="{0AC58A0F-4FE6-0242-3BF1-9A2DB1BA2BEB}"/>
-                </a:ext>
-              </a:extLst>
-            </p:cNvPr>
-            <p:cNvPicPr>
-              <a:picLocks noChangeAspect="1" noChangeArrowheads="1"/>
-            </p:cNvPicPr>
-            <p:nvPr/>
-          </p:nvPicPr>
-          <p:blipFill>
-            <a:blip r:embed="rId6">
-              <a:extLst>
-                <a:ext uri="{28A0092B-C50C-407E-A947-70E740481C1C}">
-                  <a14:useLocalDpi xmlns:a14="http://schemas.microsoft.com/office/drawing/2010/main" val="0"/>
-                </a:ext>
-              </a:extLst>
-            </a:blip>
-            <a:srcRect/>
-            <a:stretch/>
-          </p:blipFill>
-          <p:spPr bwMode="auto">
-            <a:xfrm>
-              <a:off x="8573932" y="2088455"/>
-              <a:ext cx="1388095" cy="1181100"/>
-            </a:xfrm>
-            <a:prstGeom prst="rect">
-              <a:avLst/>
-            </a:prstGeom>
-            <a:noFill/>
-            <a:extLst>
-              <a:ext uri="{909E8E84-426E-40DD-AFC4-6F175D3DCCD1}">
-                <a14:hiddenFill xmlns:a14="http://schemas.microsoft.com/office/drawing/2010/main">
-                  <a:solidFill>
-                    <a:srgbClr val="FFFFFF"/>
-                  </a:solidFill>
-                </a14:hiddenFill>
-              </a:ext>
-            </a:extLst>
-          </p:spPr>
-        </p:pic>
-      </p:grpSp>
-    </p:spTree>
-    <p:extLst>
-      <p:ext uri="{BB962C8B-B14F-4D97-AF65-F5344CB8AC3E}">
-        <p14:creationId xmlns:p14="http://schemas.microsoft.com/office/powerpoint/2010/main" val="4072107092"/>
       </p:ext>
     </p:extLst>
   </p:cSld>

</xml_diff>

<commit_message>
[01/25] Generally working Text Loop Completed.
Potential Issues remaining.
</commit_message>
<xml_diff>
--- a/sample_ppt/math_simple.pptx
+++ b/sample_ppt/math_simple.pptx
@@ -206,7 +206,7 @@
           <a:p>
             <a:fld id="{6AF810A6-5DC3-41BA-B9AF-1AFC43B9B844}" type="datetimeFigureOut">
               <a:rPr lang="ko-KR" altLang="en-US" smtClean="0"/>
-              <a:t>2026-01-16</a:t>
+              <a:t>2026-01-23</a:t>
             </a:fld>
             <a:endParaRPr lang="ko-KR" altLang="en-US"/>
           </a:p>
@@ -952,7 +952,7 @@
           <a:p>
             <a:fld id="{5089586E-BD85-40F7-91D0-2D30F22E1420}" type="datetime1">
               <a:rPr lang="ko-KR" altLang="en-US" smtClean="0"/>
-              <a:t>2026-01-16</a:t>
+              <a:t>2026-01-23</a:t>
             </a:fld>
             <a:endParaRPr lang="ko-KR" altLang="en-US"/>
           </a:p>
@@ -1150,7 +1150,7 @@
           <a:p>
             <a:fld id="{227C3C5F-4006-4632-B3DE-1A450914749C}" type="datetime1">
               <a:rPr lang="ko-KR" altLang="en-US" smtClean="0"/>
-              <a:t>2026-01-16</a:t>
+              <a:t>2026-01-23</a:t>
             </a:fld>
             <a:endParaRPr lang="ko-KR" altLang="en-US"/>
           </a:p>
@@ -1358,7 +1358,7 @@
           <a:p>
             <a:fld id="{DC02F847-FBC0-40A1-9801-1A7F5DBD685C}" type="datetime1">
               <a:rPr lang="ko-KR" altLang="en-US" smtClean="0"/>
-              <a:t>2026-01-16</a:t>
+              <a:t>2026-01-23</a:t>
             </a:fld>
             <a:endParaRPr lang="ko-KR" altLang="en-US"/>
           </a:p>
@@ -1616,7 +1616,7 @@
           <a:p>
             <a:fld id="{7C69DA4C-6DB5-4971-83A0-D7A667832670}" type="datetime1">
               <a:rPr lang="ko-KR" altLang="en-US" smtClean="0"/>
-              <a:t>2026-01-16</a:t>
+              <a:t>2026-01-23</a:t>
             </a:fld>
             <a:endParaRPr lang="ko-KR" altLang="en-US" dirty="0"/>
           </a:p>
@@ -1901,7 +1901,7 @@
           <a:p>
             <a:fld id="{A445D7E9-20A9-49C9-9C3A-2ABAF3661646}" type="datetime1">
               <a:rPr lang="ko-KR" altLang="en-US" smtClean="0"/>
-              <a:t>2026-01-16</a:t>
+              <a:t>2026-01-23</a:t>
             </a:fld>
             <a:endParaRPr lang="ko-KR" altLang="en-US"/>
           </a:p>
@@ -2166,7 +2166,7 @@
           <a:p>
             <a:fld id="{624A77D6-389E-4385-B919-32520EBBB886}" type="datetime1">
               <a:rPr lang="ko-KR" altLang="en-US" smtClean="0"/>
-              <a:t>2026-01-16</a:t>
+              <a:t>2026-01-23</a:t>
             </a:fld>
             <a:endParaRPr lang="ko-KR" altLang="en-US"/>
           </a:p>
@@ -2578,7 +2578,7 @@
           <a:p>
             <a:fld id="{359C83EB-4379-4C4A-A729-83BED85011BC}" type="datetime1">
               <a:rPr lang="ko-KR" altLang="en-US" smtClean="0"/>
-              <a:t>2026-01-16</a:t>
+              <a:t>2026-01-23</a:t>
             </a:fld>
             <a:endParaRPr lang="ko-KR" altLang="en-US"/>
           </a:p>
@@ -2719,7 +2719,7 @@
           <a:p>
             <a:fld id="{5545A2FA-8E15-452C-BCBA-7138BF312C2F}" type="datetime1">
               <a:rPr lang="ko-KR" altLang="en-US" smtClean="0"/>
-              <a:t>2026-01-16</a:t>
+              <a:t>2026-01-23</a:t>
             </a:fld>
             <a:endParaRPr lang="ko-KR" altLang="en-US"/>
           </a:p>
@@ -2832,7 +2832,7 @@
           <a:p>
             <a:fld id="{DC176177-E219-4A9E-8B2B-5E34E3322412}" type="datetime1">
               <a:rPr lang="ko-KR" altLang="en-US" smtClean="0"/>
-              <a:t>2026-01-16</a:t>
+              <a:t>2026-01-23</a:t>
             </a:fld>
             <a:endParaRPr lang="ko-KR" altLang="en-US"/>
           </a:p>
@@ -3143,7 +3143,7 @@
           <a:p>
             <a:fld id="{05B36191-433A-4CBD-B79B-1FD571FC08F0}" type="datetime1">
               <a:rPr lang="ko-KR" altLang="en-US" smtClean="0"/>
-              <a:t>2026-01-16</a:t>
+              <a:t>2026-01-23</a:t>
             </a:fld>
             <a:endParaRPr lang="ko-KR" altLang="en-US"/>
           </a:p>
@@ -3431,7 +3431,7 @@
           <a:p>
             <a:fld id="{92B00B89-E558-46DB-9986-9528BDBC138C}" type="datetime1">
               <a:rPr lang="ko-KR" altLang="en-US" smtClean="0"/>
-              <a:t>2026-01-16</a:t>
+              <a:t>2026-01-23</a:t>
             </a:fld>
             <a:endParaRPr lang="ko-KR" altLang="en-US"/>
           </a:p>
@@ -3672,7 +3672,7 @@
           <a:p>
             <a:fld id="{3027570D-6A7A-4AF9-B8FF-A0876744ADD1}" type="datetime1">
               <a:rPr lang="ko-KR" altLang="en-US" smtClean="0"/>
-              <a:t>2026-01-16</a:t>
+              <a:t>2026-01-23</a:t>
             </a:fld>
             <a:endParaRPr lang="ko-KR" altLang="en-US"/>
           </a:p>

</xml_diff>